<commit_message>
Updated RG and STET files
Updated RG and STET files to match Teams
</commit_message>
<xml_diff>
--- a/training/English (en)/Refinement and Publication Training [R&P]/Spiritual Terms/Spiritual Terms Evaluation WT Slides.pptx
+++ b/training/English (en)/Refinement and Publication Training [R&P]/Spiritual Terms/Spiritual Terms Evaluation WT Slides.pptx
@@ -146,43 +146,6 @@
 </p:cmAuthorLst>
 </file>
 
-<file path=ppt/revisionInfo.xml><?xml version="1.0" encoding="utf-8"?>
-<p1510:revInfo xmlns:a="http://schemas.openxmlformats.org/drawingml/2006/main" xmlns:r="http://schemas.openxmlformats.org/officeDocument/2006/relationships" xmlns:p1510="http://schemas.microsoft.com/office/powerpoint/2015/10/main">
-  <p1510:revLst>
-    <p1510:client id="{8228E5A9-4C83-5CE5-FBEB-D073E8E9F08B}" v="1" dt="2024-11-14T13:59:58.021"/>
-  </p1510:revLst>
-</p1510:revInfo>
-</file>
-
-<file path=ppt/changesInfos/changesInfo1.xml><?xml version="1.0" encoding="utf-8"?>
-<pc:chgInfo xmlns:a="http://schemas.openxmlformats.org/drawingml/2006/main" xmlns:r="http://schemas.openxmlformats.org/officeDocument/2006/relationships" xmlns:ac="http://schemas.microsoft.com/office/drawing/2013/main/command" xmlns:pc="http://schemas.microsoft.com/office/powerpoint/2013/main/command">
-  <pc:docChgLst>
-    <pc:chgData name="Tony Tophoney" userId="S::tony_tophoney@wycliffeassociates.org::90e3604e-3128-415a-9e4b-261baf8fabbf" providerId="AD" clId="Web-{8228E5A9-4C83-5CE5-FBEB-D073E8E9F08B}"/>
-    <pc:docChg chg="modSld">
-      <pc:chgData name="Tony Tophoney" userId="S::tony_tophoney@wycliffeassociates.org::90e3604e-3128-415a-9e4b-261baf8fabbf" providerId="AD" clId="Web-{8228E5A9-4C83-5CE5-FBEB-D073E8E9F08B}" dt="2024-11-14T13:59:58.021" v="0" actId="1076"/>
-      <pc:docMkLst>
-        <pc:docMk/>
-      </pc:docMkLst>
-      <pc:sldChg chg="modSp">
-        <pc:chgData name="Tony Tophoney" userId="S::tony_tophoney@wycliffeassociates.org::90e3604e-3128-415a-9e4b-261baf8fabbf" providerId="AD" clId="Web-{8228E5A9-4C83-5CE5-FBEB-D073E8E9F08B}" dt="2024-11-14T13:59:58.021" v="0" actId="1076"/>
-        <pc:sldMkLst>
-          <pc:docMk/>
-          <pc:sldMk cId="3434903343" sldId="312"/>
-        </pc:sldMkLst>
-        <pc:picChg chg="mod">
-          <ac:chgData name="Tony Tophoney" userId="S::tony_tophoney@wycliffeassociates.org::90e3604e-3128-415a-9e4b-261baf8fabbf" providerId="AD" clId="Web-{8228E5A9-4C83-5CE5-FBEB-D073E8E9F08B}" dt="2024-11-14T13:59:58.021" v="0" actId="1076"/>
-          <ac:picMkLst>
-            <pc:docMk/>
-            <pc:sldMk cId="3434903343" sldId="312"/>
-            <ac:picMk id="3" creationId="{CBE3F6DE-9FAF-2743-8890-EE2725B8D720}"/>
-          </ac:picMkLst>
-        </pc:picChg>
-      </pc:sldChg>
-    </pc:docChg>
-  </pc:docChgLst>
-</pc:chgInfo>
-</file>
-
 <file path=ppt/notesMasters/notesMaster1.xml><?xml version="1.0" encoding="utf-8"?>
 <p:notesMaster xmlns:a="http://schemas.openxmlformats.org/drawingml/2006/main" xmlns:r="http://schemas.openxmlformats.org/officeDocument/2006/relationships" xmlns:p="http://schemas.openxmlformats.org/presentationml/2006/main">
   <p:cSld>
@@ -265,7 +228,7 @@
           <a:p>
             <a:fld id="{AC6AA070-92F4-A447-BB88-F5E94FF9CF8B}" type="datetimeFigureOut">
               <a:rPr lang="en-US" smtClean="0"/>
-              <a:t>11/14/2024</a:t>
+              <a:t>11/7/25</a:t>
             </a:fld>
             <a:endParaRPr lang="en-US"/>
           </a:p>
@@ -669,7 +632,7 @@
           <a:p>
             <a:fld id="{2D176C0A-5C67-429D-B78E-C0F7FE360763}" type="datetimeFigureOut">
               <a:rPr lang="en-US" smtClean="0"/>
-              <a:t>11/14/2024</a:t>
+              <a:t>11/7/25</a:t>
             </a:fld>
             <a:endParaRPr lang="en-US"/>
           </a:p>
@@ -3200,6 +3163,9 @@
                     <p:cTn id="3" fill="hold">
                       <p:stCondLst>
                         <p:cond delay="indefinite"/>
+                        <p:cond evt="onBegin" delay="0">
+                          <p:tn val="2"/>
+                        </p:cond>
                       </p:stCondLst>
                       <p:childTnLst>
                         <p:par>
@@ -3209,7 +3175,7 @@
                             </p:stCondLst>
                             <p:childTnLst>
                               <p:par>
-                                <p:cTn id="5" presetID="2" presetClass="entr" presetSubtype="4" fill="hold" nodeType="clickEffect">
+                                <p:cTn id="5" presetID="6" presetClass="entr" presetSubtype="32" fill="hold" nodeType="withEffect">
                                   <p:stCondLst>
                                     <p:cond delay="0"/>
                                   </p:stCondLst>
@@ -3217,91 +3183,6 @@
                                     <p:set>
                                       <p:cBhvr>
                                         <p:cTn id="6" dur="1" fill="hold">
-                                          <p:stCondLst>
-                                            <p:cond delay="0"/>
-                                          </p:stCondLst>
-                                        </p:cTn>
-                                        <p:tgtEl>
-                                          <p:spTgt spid="2">
-                                            <p:txEl>
-                                              <p:pRg st="0" end="0"/>
-                                            </p:txEl>
-                                          </p:spTgt>
-                                        </p:tgtEl>
-                                        <p:attrNameLst>
-                                          <p:attrName>style.visibility</p:attrName>
-                                        </p:attrNameLst>
-                                      </p:cBhvr>
-                                      <p:to>
-                                        <p:strVal val="visible"/>
-                                      </p:to>
-                                    </p:set>
-                                    <p:anim calcmode="lin" valueType="num">
-                                      <p:cBhvr additive="base">
-                                        <p:cTn id="7" dur="500" fill="hold"/>
-                                        <p:tgtEl>
-                                          <p:spTgt spid="2">
-                                            <p:txEl>
-                                              <p:pRg st="0" end="0"/>
-                                            </p:txEl>
-                                          </p:spTgt>
-                                        </p:tgtEl>
-                                        <p:attrNameLst>
-                                          <p:attrName>ppt_x</p:attrName>
-                                        </p:attrNameLst>
-                                      </p:cBhvr>
-                                      <p:tavLst>
-                                        <p:tav tm="0">
-                                          <p:val>
-                                            <p:strVal val="#ppt_x"/>
-                                          </p:val>
-                                        </p:tav>
-                                        <p:tav tm="100000">
-                                          <p:val>
-                                            <p:strVal val="#ppt_x"/>
-                                          </p:val>
-                                        </p:tav>
-                                      </p:tavLst>
-                                    </p:anim>
-                                    <p:anim calcmode="lin" valueType="num">
-                                      <p:cBhvr additive="base">
-                                        <p:cTn id="8" dur="500" fill="hold"/>
-                                        <p:tgtEl>
-                                          <p:spTgt spid="2">
-                                            <p:txEl>
-                                              <p:pRg st="0" end="0"/>
-                                            </p:txEl>
-                                          </p:spTgt>
-                                        </p:tgtEl>
-                                        <p:attrNameLst>
-                                          <p:attrName>ppt_y</p:attrName>
-                                        </p:attrNameLst>
-                                      </p:cBhvr>
-                                      <p:tavLst>
-                                        <p:tav tm="0">
-                                          <p:val>
-                                            <p:strVal val="1+#ppt_h/2"/>
-                                          </p:val>
-                                        </p:tav>
-                                        <p:tav tm="100000">
-                                          <p:val>
-                                            <p:strVal val="#ppt_y"/>
-                                          </p:val>
-                                        </p:tav>
-                                      </p:tavLst>
-                                    </p:anim>
-                                  </p:childTnLst>
-                                </p:cTn>
-                              </p:par>
-                              <p:par>
-                                <p:cTn id="9" presetID="6" presetClass="entr" presetSubtype="32" fill="hold" nodeType="withEffect">
-                                  <p:stCondLst>
-                                    <p:cond delay="0"/>
-                                  </p:stCondLst>
-                                  <p:childTnLst>
-                                    <p:set>
-                                      <p:cBhvr>
-                                        <p:cTn id="10" dur="1" fill="hold">
                                           <p:stCondLst>
                                             <p:cond delay="0"/>
                                           </p:stCondLst>
@@ -3319,7 +3200,7 @@
                                     </p:set>
                                     <p:animEffect transition="in" filter="circle(out)">
                                       <p:cBhvr>
-                                        <p:cTn id="11" dur="1000"/>
+                                        <p:cTn id="7" dur="1000"/>
                                         <p:tgtEl>
                                           <p:spTgt spid="5"/>
                                         </p:tgtEl>
@@ -3335,26 +3216,26 @@
                     </p:cTn>
                   </p:par>
                   <p:par>
-                    <p:cTn id="12" fill="hold">
+                    <p:cTn id="8" fill="hold">
                       <p:stCondLst>
                         <p:cond delay="indefinite"/>
                       </p:stCondLst>
                       <p:childTnLst>
                         <p:par>
-                          <p:cTn id="13" fill="hold">
+                          <p:cTn id="9" fill="hold">
                             <p:stCondLst>
                               <p:cond delay="0"/>
                             </p:stCondLst>
                             <p:childTnLst>
                               <p:par>
-                                <p:cTn id="14" presetID="2" presetClass="entr" presetSubtype="4" fill="hold" nodeType="clickEffect">
+                                <p:cTn id="10" presetID="2" presetClass="entr" presetSubtype="4" fill="hold" nodeType="clickEffect">
                                   <p:stCondLst>
                                     <p:cond delay="0"/>
                                   </p:stCondLst>
                                   <p:childTnLst>
                                     <p:set>
                                       <p:cBhvr>
-                                        <p:cTn id="15" dur="1" fill="hold">
+                                        <p:cTn id="11" dur="1" fill="hold">
                                           <p:stCondLst>
                                             <p:cond delay="0"/>
                                           </p:stCondLst>
@@ -3376,7 +3257,7 @@
                                     </p:set>
                                     <p:anim calcmode="lin" valueType="num">
                                       <p:cBhvr additive="base">
-                                        <p:cTn id="16" dur="500" fill="hold"/>
+                                        <p:cTn id="12" dur="500" fill="hold"/>
                                         <p:tgtEl>
                                           <p:spTgt spid="2">
                                             <p:txEl>
@@ -3403,7 +3284,7 @@
                                     </p:anim>
                                     <p:anim calcmode="lin" valueType="num">
                                       <p:cBhvr additive="base">
-                                        <p:cTn id="17" dur="500" fill="hold"/>
+                                        <p:cTn id="13" dur="500" fill="hold"/>
                                         <p:tgtEl>
                                           <p:spTgt spid="2">
                                             <p:txEl>
@@ -3432,14 +3313,14 @@
                                 </p:cTn>
                               </p:par>
                               <p:par>
-                                <p:cTn id="18" presetID="6" presetClass="entr" presetSubtype="32" fill="hold" nodeType="withEffect">
+                                <p:cTn id="14" presetID="6" presetClass="entr" presetSubtype="32" fill="hold" nodeType="withEffect">
                                   <p:stCondLst>
                                     <p:cond delay="0"/>
                                   </p:stCondLst>
                                   <p:childTnLst>
                                     <p:set>
                                       <p:cBhvr>
-                                        <p:cTn id="19" dur="1" fill="hold">
+                                        <p:cTn id="15" dur="1" fill="hold">
                                           <p:stCondLst>
                                             <p:cond delay="0"/>
                                           </p:stCondLst>
@@ -3457,7 +3338,7 @@
                                     </p:set>
                                     <p:animEffect transition="in" filter="circle(out)">
                                       <p:cBhvr>
-                                        <p:cTn id="20" dur="1000"/>
+                                        <p:cTn id="16" dur="1000"/>
                                         <p:tgtEl>
                                           <p:spTgt spid="11"/>
                                         </p:tgtEl>
@@ -5575,10 +5456,10 @@
       </p:grpSpPr>
       <p:pic>
         <p:nvPicPr>
-          <p:cNvPr id="6" name="Picture 5">
+          <p:cNvPr id="7" name="Graphic 6" descr="User with solid fill">
             <a:extLst>
               <a:ext uri="{FF2B5EF4-FFF2-40B4-BE49-F238E27FC236}">
-                <a16:creationId xmlns:a16="http://schemas.microsoft.com/office/drawing/2014/main" id="{6FABFBE9-3E15-9A87-94CA-113E1B52340F}"/>
+                <a16:creationId xmlns:a16="http://schemas.microsoft.com/office/drawing/2014/main" id="{432D0FD7-82DC-56C3-2FF9-AAC5B9BC3972}"/>
               </a:ext>
             </a:extLst>
           </p:cNvPr>
@@ -5593,43 +5474,8 @@
               <a:ext uri="{28A0092B-C50C-407E-A947-70E740481C1C}">
                 <a14:useLocalDpi xmlns:a14="http://schemas.microsoft.com/office/drawing/2010/main" val="0"/>
               </a:ext>
-            </a:extLst>
-          </a:blip>
-          <a:srcRect r="1330" b="6842"/>
-          <a:stretch/>
-        </p:blipFill>
-        <p:spPr>
-          <a:xfrm>
-            <a:off x="1209296" y="275472"/>
-            <a:ext cx="6838488" cy="6434424"/>
-          </a:xfrm>
-          <a:prstGeom prst="rect">
-            <a:avLst/>
-          </a:prstGeom>
-        </p:spPr>
-      </p:pic>
-      <p:pic>
-        <p:nvPicPr>
-          <p:cNvPr id="7" name="Graphic 6" descr="User with solid fill">
-            <a:extLst>
-              <a:ext uri="{FF2B5EF4-FFF2-40B4-BE49-F238E27FC236}">
-                <a16:creationId xmlns:a16="http://schemas.microsoft.com/office/drawing/2014/main" id="{432D0FD7-82DC-56C3-2FF9-AAC5B9BC3972}"/>
-              </a:ext>
-            </a:extLst>
-          </p:cNvPr>
-          <p:cNvPicPr>
-            <a:picLocks noChangeAspect="1"/>
-          </p:cNvPicPr>
-          <p:nvPr/>
-        </p:nvPicPr>
-        <p:blipFill>
-          <a:blip r:embed="rId3">
-            <a:extLst>
-              <a:ext uri="{28A0092B-C50C-407E-A947-70E740481C1C}">
-                <a14:useLocalDpi xmlns:a14="http://schemas.microsoft.com/office/drawing/2010/main" val="0"/>
-              </a:ext>
               <a:ext uri="{96DAC541-7B7A-43D3-8B79-37D633B846F1}">
-                <asvg:svgBlip xmlns:asvg="http://schemas.microsoft.com/office/drawing/2016/SVG/main" r:embed="rId4"/>
+                <asvg:svgBlip xmlns:asvg="http://schemas.microsoft.com/office/drawing/2016/SVG/main" r:embed="rId3"/>
               </a:ext>
             </a:extLst>
           </a:blip>
@@ -5662,13 +5508,13 @@
           <p:nvPr/>
         </p:nvPicPr>
         <p:blipFill>
-          <a:blip r:embed="rId3">
+          <a:blip r:embed="rId2">
             <a:extLst>
               <a:ext uri="{28A0092B-C50C-407E-A947-70E740481C1C}">
                 <a14:useLocalDpi xmlns:a14="http://schemas.microsoft.com/office/drawing/2010/main" val="0"/>
               </a:ext>
               <a:ext uri="{96DAC541-7B7A-43D3-8B79-37D633B846F1}">
-                <asvg:svgBlip xmlns:asvg="http://schemas.microsoft.com/office/drawing/2016/SVG/main" r:embed="rId4"/>
+                <asvg:svgBlip xmlns:asvg="http://schemas.microsoft.com/office/drawing/2016/SVG/main" r:embed="rId3"/>
               </a:ext>
             </a:extLst>
           </a:blip>
@@ -5701,13 +5547,13 @@
           <p:nvPr/>
         </p:nvPicPr>
         <p:blipFill>
-          <a:blip r:embed="rId3">
+          <a:blip r:embed="rId2">
             <a:extLst>
               <a:ext uri="{28A0092B-C50C-407E-A947-70E740481C1C}">
                 <a14:useLocalDpi xmlns:a14="http://schemas.microsoft.com/office/drawing/2010/main" val="0"/>
               </a:ext>
               <a:ext uri="{96DAC541-7B7A-43D3-8B79-37D633B846F1}">
-                <asvg:svgBlip xmlns:asvg="http://schemas.microsoft.com/office/drawing/2016/SVG/main" r:embed="rId4"/>
+                <asvg:svgBlip xmlns:asvg="http://schemas.microsoft.com/office/drawing/2016/SVG/main" r:embed="rId3"/>
               </a:ext>
             </a:extLst>
           </a:blip>
@@ -5740,13 +5586,13 @@
           <p:nvPr/>
         </p:nvPicPr>
         <p:blipFill>
-          <a:blip r:embed="rId3">
+          <a:blip r:embed="rId2">
             <a:extLst>
               <a:ext uri="{28A0092B-C50C-407E-A947-70E740481C1C}">
                 <a14:useLocalDpi xmlns:a14="http://schemas.microsoft.com/office/drawing/2010/main" val="0"/>
               </a:ext>
               <a:ext uri="{96DAC541-7B7A-43D3-8B79-37D633B846F1}">
-                <asvg:svgBlip xmlns:asvg="http://schemas.microsoft.com/office/drawing/2016/SVG/main" r:embed="rId4"/>
+                <asvg:svgBlip xmlns:asvg="http://schemas.microsoft.com/office/drawing/2016/SVG/main" r:embed="rId3"/>
               </a:ext>
             </a:extLst>
           </a:blip>
@@ -5779,13 +5625,13 @@
           <p:nvPr/>
         </p:nvPicPr>
         <p:blipFill>
-          <a:blip r:embed="rId5">
+          <a:blip r:embed="rId4">
             <a:extLst>
               <a:ext uri="{28A0092B-C50C-407E-A947-70E740481C1C}">
                 <a14:useLocalDpi xmlns:a14="http://schemas.microsoft.com/office/drawing/2010/main" val="0"/>
               </a:ext>
               <a:ext uri="{96DAC541-7B7A-43D3-8B79-37D633B846F1}">
-                <asvg:svgBlip xmlns:asvg="http://schemas.microsoft.com/office/drawing/2016/SVG/main" r:embed="rId6"/>
+                <asvg:svgBlip xmlns:asvg="http://schemas.microsoft.com/office/drawing/2016/SVG/main" r:embed="rId5"/>
               </a:ext>
             </a:extLst>
           </a:blip>
@@ -5803,6 +5649,42 @@
           </a:prstGeom>
         </p:spPr>
       </p:pic>
+      <p:pic>
+        <p:nvPicPr>
+          <p:cNvPr id="15" name="Picture 14" descr="A screenshot of a survey&#10;&#10;AI-generated content may be incorrect.">
+            <a:extLst>
+              <a:ext uri="{FF2B5EF4-FFF2-40B4-BE49-F238E27FC236}">
+                <a16:creationId xmlns:a16="http://schemas.microsoft.com/office/drawing/2014/main" id="{3C20E3FC-D55B-09D0-2448-E82DCD4DB798}"/>
+              </a:ext>
+            </a:extLst>
+          </p:cNvPr>
+          <p:cNvPicPr>
+            <a:picLocks noChangeAspect="1"/>
+          </p:cNvPicPr>
+          <p:nvPr/>
+        </p:nvPicPr>
+        <p:blipFill>
+          <a:blip r:embed="rId6">
+            <a:extLst>
+              <a:ext uri="{28A0092B-C50C-407E-A947-70E740481C1C}">
+                <a14:useLocalDpi xmlns:a14="http://schemas.microsoft.com/office/drawing/2010/main" val="0"/>
+              </a:ext>
+            </a:extLst>
+          </a:blip>
+          <a:stretch>
+            <a:fillRect/>
+          </a:stretch>
+        </p:blipFill>
+        <p:spPr>
+          <a:xfrm>
+            <a:off x="1422400" y="323850"/>
+            <a:ext cx="6299200" cy="6210300"/>
+          </a:xfrm>
+          <a:prstGeom prst="rect">
+            <a:avLst/>
+          </a:prstGeom>
+        </p:spPr>
+      </p:pic>
     </p:spTree>
     <p:extLst>
       <p:ext uri="{BB962C8B-B14F-4D97-AF65-F5344CB8AC3E}">
@@ -5813,81 +5695,6 @@
   <p:clrMapOvr>
     <a:masterClrMapping/>
   </p:clrMapOvr>
-  <p:timing>
-    <p:tnLst>
-      <p:par>
-        <p:cTn id="1" dur="indefinite" restart="never" nodeType="tmRoot">
-          <p:childTnLst>
-            <p:seq concurrent="1" nextAc="seek">
-              <p:cTn id="2" dur="indefinite" nodeType="mainSeq">
-                <p:childTnLst>
-                  <p:par>
-                    <p:cTn id="3" fill="hold">
-                      <p:stCondLst>
-                        <p:cond delay="indefinite"/>
-                      </p:stCondLst>
-                      <p:childTnLst>
-                        <p:par>
-                          <p:cTn id="4" fill="hold">
-                            <p:stCondLst>
-                              <p:cond delay="0"/>
-                            </p:stCondLst>
-                            <p:childTnLst>
-                              <p:par>
-                                <p:cTn id="5" presetID="1" presetClass="entr" presetSubtype="0" fill="hold" nodeType="clickEffect">
-                                  <p:stCondLst>
-                                    <p:cond delay="0"/>
-                                  </p:stCondLst>
-                                  <p:childTnLst>
-                                    <p:set>
-                                      <p:cBhvr>
-                                        <p:cTn id="6" dur="1" fill="hold">
-                                          <p:stCondLst>
-                                            <p:cond delay="0"/>
-                                          </p:stCondLst>
-                                        </p:cTn>
-                                        <p:tgtEl>
-                                          <p:spTgt spid="6"/>
-                                        </p:tgtEl>
-                                        <p:attrNameLst>
-                                          <p:attrName>style.visibility</p:attrName>
-                                        </p:attrNameLst>
-                                      </p:cBhvr>
-                                      <p:to>
-                                        <p:strVal val="visible"/>
-                                      </p:to>
-                                    </p:set>
-                                  </p:childTnLst>
-                                </p:cTn>
-                              </p:par>
-                            </p:childTnLst>
-                          </p:cTn>
-                        </p:par>
-                      </p:childTnLst>
-                    </p:cTn>
-                  </p:par>
-                </p:childTnLst>
-              </p:cTn>
-              <p:prevCondLst>
-                <p:cond evt="onPrev" delay="0">
-                  <p:tgtEl>
-                    <p:sldTgt/>
-                  </p:tgtEl>
-                </p:cond>
-              </p:prevCondLst>
-              <p:nextCondLst>
-                <p:cond evt="onNext" delay="0">
-                  <p:tgtEl>
-                    <p:sldTgt/>
-                  </p:tgtEl>
-                </p:cond>
-              </p:nextCondLst>
-            </p:seq>
-          </p:childTnLst>
-        </p:cTn>
-      </p:par>
-    </p:tnLst>
-  </p:timing>
 </p:sld>
 </file>
 
@@ -6130,7 +5937,7 @@
         </p:blipFill>
         <p:spPr>
           <a:xfrm>
-            <a:off x="1286454" y="938412"/>
+            <a:off x="1406107" y="516478"/>
             <a:ext cx="7570466" cy="5422815"/>
           </a:xfrm>
           <a:prstGeom prst="rect">
@@ -8665,17 +8472,8 @@
 </file>
 
 <file path=customXml/item2.xml><?xml version="1.0" encoding="utf-8"?>
-<?mso-contentType ?>
-<FormTemplates xmlns="http://schemas.microsoft.com/sharepoint/v3/contenttype/forms">
-  <Display>DocumentLibraryForm</Display>
-  <Edit>DocumentLibraryForm</Edit>
-  <New>DocumentLibraryForm</New>
-</FormTemplates>
-</file>
-
-<file path=customXml/item3.xml><?xml version="1.0" encoding="utf-8"?>
-<ct:contentTypeSchema xmlns:ct="http://schemas.microsoft.com/office/2006/metadata/contentType" xmlns:ma="http://schemas.microsoft.com/office/2006/metadata/properties/metaAttributes" ct:_="" ma:_="" ma:contentTypeName="Document" ma:contentTypeID="0x0101002F017C5ECD5AE84588140775F5D9B6FC" ma:contentTypeVersion="10" ma:contentTypeDescription="Create a new document." ma:contentTypeScope="" ma:versionID="3fff9ed69b78a1d1c48e3f96068d2b17">
-  <xsd:schema xmlns:xsd="http://www.w3.org/2001/XMLSchema" xmlns:xs="http://www.w3.org/2001/XMLSchema" xmlns:p="http://schemas.microsoft.com/office/2006/metadata/properties" xmlns:ns2="fee82e44-1fa4-4144-8309-00fed2bf4198" xmlns:ns3="1a61c928-f5f6-4989-bd5d-cb8872a1b06d" targetNamespace="http://schemas.microsoft.com/office/2006/metadata/properties" ma:root="true" ma:fieldsID="7b2c40b849e0c1cff02f16dd8f1be10b" ns2:_="" ns3:_="">
+<ct:contentTypeSchema xmlns:ct="http://schemas.microsoft.com/office/2006/metadata/contentType" xmlns:ma="http://schemas.microsoft.com/office/2006/metadata/properties/metaAttributes" ct:_="" ma:_="" ma:contentTypeName="Document" ma:contentTypeID="0x0101002F017C5ECD5AE84588140775F5D9B6FC" ma:contentTypeVersion="10" ma:contentTypeDescription="Create a new document." ma:contentTypeScope="" ma:versionID="1df1dec52c25bb0135bdda8c7b7dd7e7">
+  <xsd:schema xmlns:xsd="http://www.w3.org/2001/XMLSchema" xmlns:xs="http://www.w3.org/2001/XMLSchema" xmlns:p="http://schemas.microsoft.com/office/2006/metadata/properties" xmlns:ns2="fee82e44-1fa4-4144-8309-00fed2bf4198" xmlns:ns3="1a61c928-f5f6-4989-bd5d-cb8872a1b06d" targetNamespace="http://schemas.microsoft.com/office/2006/metadata/properties" ma:root="true" ma:fieldsID="efed797755febffe8ac30e701dff32dc" ns2:_="" ns3:_="">
     <xsd:import namespace="fee82e44-1fa4-4144-8309-00fed2bf4198"/>
     <xsd:import namespace="1a61c928-f5f6-4989-bd5d-cb8872a1b06d"/>
     <xsd:element name="properties">
@@ -8874,6 +8672,15 @@
 </ct:contentTypeSchema>
 </file>
 
+<file path=customXml/item3.xml><?xml version="1.0" encoding="utf-8"?>
+<?mso-contentType ?>
+<FormTemplates xmlns="http://schemas.microsoft.com/sharepoint/v3/contenttype/forms">
+  <Display>DocumentLibraryForm</Display>
+  <Edit>DocumentLibraryForm</Edit>
+  <New>DocumentLibraryForm</New>
+</FormTemplates>
+</file>
+
 <file path=customXml/itemProps1.xml><?xml version="1.0" encoding="utf-8"?>
 <ds:datastoreItem xmlns:ds="http://schemas.openxmlformats.org/officeDocument/2006/customXml" ds:itemID="{DD870300-B03F-45F7-9154-521D8C74684E}">
   <ds:schemaRefs>
@@ -8884,28 +8691,13 @@
 </file>
 
 <file path=customXml/itemProps2.xml><?xml version="1.0" encoding="utf-8"?>
+<ds:datastoreItem xmlns:ds="http://schemas.openxmlformats.org/officeDocument/2006/customXml" ds:itemID="{72D4B0D4-4E91-4708-AA8E-94D7F19FE554}"/>
+</file>
+
+<file path=customXml/itemProps3.xml><?xml version="1.0" encoding="utf-8"?>
 <ds:datastoreItem xmlns:ds="http://schemas.openxmlformats.org/officeDocument/2006/customXml" ds:itemID="{B178770A-F6AC-406B-AF0D-88CBCF36B701}">
   <ds:schemaRefs>
     <ds:schemaRef ds:uri="http://schemas.microsoft.com/sharepoint/v3/contenttype/forms"/>
   </ds:schemaRefs>
 </ds:datastoreItem>
-</file>
-
-<file path=customXml/itemProps3.xml><?xml version="1.0" encoding="utf-8"?>
-<ds:datastoreItem xmlns:ds="http://schemas.openxmlformats.org/officeDocument/2006/customXml" ds:itemID="{D1D02729-1898-44AD-B019-DD3A65E8110F}">
-  <ds:schemaRefs>
-    <ds:schemaRef ds:uri="http://schemas.microsoft.com/office/2006/metadata/contentType"/>
-    <ds:schemaRef ds:uri="http://schemas.microsoft.com/office/2006/metadata/properties/metaAttributes"/>
-    <ds:schemaRef ds:uri="http://www.w3.org/2001/XMLSchema"/>
-    <ds:schemaRef ds:uri="http://schemas.microsoft.com/office/2006/metadata/properties"/>
-    <ds:schemaRef ds:uri="fee82e44-1fa4-4144-8309-00fed2bf4198"/>
-    <ds:schemaRef ds:uri="1a61c928-f5f6-4989-bd5d-cb8872a1b06d"/>
-    <ds:schemaRef ds:uri="http://schemas.microsoft.com/office/2006/documentManagement/types"/>
-    <ds:schemaRef ds:uri="http://schemas.microsoft.com/office/infopath/2007/PartnerControls"/>
-    <ds:schemaRef ds:uri="http://schemas.openxmlformats.org/package/2006/metadata/core-properties"/>
-    <ds:schemaRef ds:uri="http://purl.org/dc/elements/1.1/"/>
-    <ds:schemaRef ds:uri="http://purl.org/dc/terms/"/>
-    <ds:schemaRef ds:uri="http://schemas.microsoft.com/internal/obd"/>
-  </ds:schemaRefs>
-</ds:datastoreItem>
 </file>
</xml_diff>